<commit_message>
correction et rectificatif ppt
</commit_message>
<xml_diff>
--- a/Présentation du projet HODOR.pptx
+++ b/Présentation du projet HODOR.pptx
@@ -5316,7 +5316,7 @@
         <p:spPr>
           <a:xfrm>
             <a:off x="838200" y="1619076"/>
-            <a:ext cx="10515600" cy="4130936"/>
+            <a:ext cx="10515600" cy="4496498"/>
           </a:xfrm>
         </p:spPr>
         <p:txBody>
@@ -5407,7 +5407,7 @@
                 </a:solidFill>
                 <a:latin typeface="Constantia" panose="02030602050306030303" pitchFamily="18" charset="0"/>
               </a:rPr>
-              <a:t> aussi, la séquence de déverrouillage par carte RFID est fonctionnel de bout en bout.</a:t>
+              <a:t> aussi, la séquence de déverrouillage par carte RFID est fonctionnelle de bout en bout.</a:t>
             </a:r>
             <a:br>
               <a:rPr lang="fr-FR" sz="2000" dirty="0">
@@ -5492,31 +5492,7 @@
                 </a:solidFill>
                 <a:latin typeface="Constantia" panose="02030602050306030303" pitchFamily="18" charset="0"/>
               </a:rPr>
-              <a:t>	- Développer un script python qui permettrait de renvoyer le statut de la porte à l’application qui afficherait le bouton en fonction de son état. Côté </a:t>
-            </a:r>
-            <a:r>
-              <a:rPr lang="fr-FR" sz="2000" dirty="0" err="1">
-                <a:solidFill>
-                  <a:schemeClr val="tx1">
-                    <a:lumMod val="75000"/>
-                    <a:lumOff val="25000"/>
-                  </a:schemeClr>
-                </a:solidFill>
-                <a:latin typeface="Constantia" panose="02030602050306030303" pitchFamily="18" charset="0"/>
-              </a:rPr>
-              <a:t>php</a:t>
-            </a:r>
-            <a:r>
-              <a:rPr lang="fr-FR" sz="2000" dirty="0">
-                <a:solidFill>
-                  <a:schemeClr val="tx1">
-                    <a:lumMod val="75000"/>
-                    <a:lumOff val="25000"/>
-                  </a:schemeClr>
-                </a:solidFill>
-                <a:latin typeface="Constantia" panose="02030602050306030303" pitchFamily="18" charset="0"/>
-              </a:rPr>
-              <a:t> la fonction est présente mais à cause du confinement nous n’avons pu faire de test pour la faire fonctionner.</a:t>
+              <a:t>	- Développer un script python qui permettrait de renvoyer le statut de la porte à l’application qui afficherait le bouton en fonction de son état et ce, en se basant sur une communication BLE. Côté PHP la fonction est présente mais à cause du confinement nous n’avons pu faire de test pour la faire fonctionner.</a:t>
             </a:r>
           </a:p>
           <a:p>

</xml_diff>